<commit_message>
Presentacion defensa de tesis
</commit_message>
<xml_diff>
--- a/Tesis/documentation/defensaTesis/presentacion.pptx
+++ b/Tesis/documentation/defensaTesis/presentacion.pptx
@@ -5,7 +5,7 @@
     <p:sldMasterId id="2147483648" r:id="rId1"/>
   </p:sldMasterIdLst>
   <p:notesMasterIdLst>
-    <p:notesMasterId r:id="rId15"/>
+    <p:notesMasterId r:id="rId17"/>
   </p:notesMasterIdLst>
   <p:sldIdLst>
     <p:sldId id="256" r:id="rId4"/>
@@ -19,6 +19,8 @@
     <p:sldId id="264" r:id="rId12"/>
     <p:sldId id="265" r:id="rId13"/>
     <p:sldId id="266" r:id="rId14"/>
+    <p:sldId id="267" r:id="rId15"/>
+    <p:sldId id="268" r:id="rId16"/>
   </p:sldIdLst>
   <p:sldSz cx="12192000" cy="6858000"/>
   <p:notesSz cx="6858000" cy="9144000"/>
@@ -144,7 +146,7 @@
       </p:grpSpPr>
       <p:sp>
         <p:nvSpPr>
-          <p:cNvPr id="1957826729" name="Header Placeholder 1"/>
+          <p:cNvPr id="1348684122" name="Header Placeholder 1"/>
           <p:cNvSpPr>
             <a:spLocks noGrp="1"/>
           </p:cNvSpPr>
@@ -178,7 +180,7 @@
       </p:sp>
       <p:sp>
         <p:nvSpPr>
-          <p:cNvPr id="2127058288" name="Date Placeholder 2"/>
+          <p:cNvPr id="447751281" name="Date Placeholder 2"/>
           <p:cNvSpPr>
             <a:spLocks noGrp="1"/>
           </p:cNvSpPr>
@@ -216,7 +218,7 @@
       </p:sp>
       <p:sp>
         <p:nvSpPr>
-          <p:cNvPr id="1752729627" name="Slide Image Placeholder 3"/>
+          <p:cNvPr id="439119742" name="Slide Image Placeholder 3"/>
           <p:cNvSpPr>
             <a:spLocks noChangeAspect="1" noGrp="1" noRot="1"/>
           </p:cNvSpPr>
@@ -252,7 +254,7 @@
       </p:sp>
       <p:sp>
         <p:nvSpPr>
-          <p:cNvPr id="797364905" name="Notes Placeholder 4"/>
+          <p:cNvPr id="1242537779" name="Notes Placeholder 4"/>
           <p:cNvSpPr>
             <a:spLocks noGrp="1"/>
           </p:cNvSpPr>
@@ -326,7 +328,7 @@
       </p:sp>
       <p:sp>
         <p:nvSpPr>
-          <p:cNvPr id="699636372" name="Footer Placeholder 5"/>
+          <p:cNvPr id="1582249897" name="Footer Placeholder 5"/>
           <p:cNvSpPr>
             <a:spLocks noGrp="1"/>
           </p:cNvSpPr>
@@ -360,7 +362,7 @@
       </p:sp>
       <p:sp>
         <p:nvSpPr>
-          <p:cNvPr id="294375620" name="Slide Number Placeholder 6"/>
+          <p:cNvPr id="872750752" name="Slide Number Placeholder 6"/>
           <p:cNvSpPr>
             <a:spLocks noGrp="1"/>
           </p:cNvSpPr>
@@ -513,7 +515,7 @@
       </p:grpSpPr>
       <p:sp>
         <p:nvSpPr>
-          <p:cNvPr id="2" name="Slide Image Placeholder 1"/>
+          <p:cNvPr id="785546685" name="Slide Image Placeholder 1"/>
           <p:cNvSpPr>
             <a:spLocks noChangeAspect="1" noGrp="1" noRot="1"/>
           </p:cNvSpPr>
@@ -525,7 +527,7 @@
       </p:sp>
       <p:sp>
         <p:nvSpPr>
-          <p:cNvPr id="3" name="Notes Placeholder 2"/>
+          <p:cNvPr id="1708859562" name="Notes Placeholder 2"/>
           <p:cNvSpPr>
             <a:spLocks noGrp="1"/>
           </p:cNvSpPr>
@@ -547,7 +549,7 @@
       </p:sp>
       <p:sp>
         <p:nvSpPr>
-          <p:cNvPr id="4" name="Slide Number Placeholder 3"/>
+          <p:cNvPr id="396329922" name="Slide Number Placeholder 3"/>
           <p:cNvSpPr>
             <a:spLocks noGrp="1"/>
           </p:cNvSpPr>
@@ -598,7 +600,7 @@
       </p:grpSpPr>
       <p:sp>
         <p:nvSpPr>
-          <p:cNvPr id="500878486" name="Slide Image Placeholder 1"/>
+          <p:cNvPr id="2118032539" name="Slide Image Placeholder 1"/>
           <p:cNvSpPr>
             <a:spLocks noChangeAspect="1" noGrp="1" noRot="1"/>
           </p:cNvSpPr>
@@ -610,7 +612,7 @@
       </p:sp>
       <p:sp>
         <p:nvSpPr>
-          <p:cNvPr id="330812287" name="Notes Placeholder 2"/>
+          <p:cNvPr id="872065394" name="Notes Placeholder 2"/>
           <p:cNvSpPr>
             <a:spLocks noGrp="1"/>
           </p:cNvSpPr>
@@ -632,7 +634,7 @@
       </p:sp>
       <p:sp>
         <p:nvSpPr>
-          <p:cNvPr id="396320581" name="Slide Number Placeholder 3"/>
+          <p:cNvPr id="1126260426" name="Slide Number Placeholder 3"/>
           <p:cNvSpPr>
             <a:spLocks noGrp="1"/>
           </p:cNvSpPr>
@@ -648,7 +650,7 @@
             <a:pPr>
               <a:defRPr/>
             </a:pPr>
-            <a:fld id="{68C90AFE-9309-CD99-FE43-A9034960F479}" type="slidenum">
+            <a:fld id="{1391D14E-50A0-CEC1-FDF1-40276DFA2666}" type="slidenum">
               <a:rPr/>
               <a:t/>
             </a:fld>
@@ -683,7 +685,7 @@
       </p:grpSpPr>
       <p:sp>
         <p:nvSpPr>
-          <p:cNvPr id="1998583100" name="Slide Image Placeholder 1"/>
+          <p:cNvPr id="1087915258" name="Slide Image Placeholder 1"/>
           <p:cNvSpPr>
             <a:spLocks noChangeAspect="1" noGrp="1" noRot="1"/>
           </p:cNvSpPr>
@@ -695,7 +697,7 @@
       </p:sp>
       <p:sp>
         <p:nvSpPr>
-          <p:cNvPr id="1645265840" name="Notes Placeholder 2"/>
+          <p:cNvPr id="38851585" name="Notes Placeholder 2"/>
           <p:cNvSpPr>
             <a:spLocks noGrp="1"/>
           </p:cNvSpPr>
@@ -717,7 +719,177 @@
       </p:sp>
       <p:sp>
         <p:nvSpPr>
-          <p:cNvPr id="357442958" name="Slide Number Placeholder 3"/>
+          <p:cNvPr id="1294554644" name="Slide Number Placeholder 3"/>
+          <p:cNvSpPr>
+            <a:spLocks noGrp="1"/>
+          </p:cNvSpPr>
+          <p:nvPr>
+            <p:ph type="sldNum" sz="quarter" idx="10"/>
+          </p:nvPr>
+        </p:nvSpPr>
+        <p:spPr bwMode="auto"/>
+        <p:txBody>
+          <a:bodyPr/>
+          <a:lstStyle/>
+          <a:p>
+            <a:pPr>
+              <a:defRPr/>
+            </a:pPr>
+            <a:fld id="{34FE6285-F706-0E74-EB16-20B02EC7539D}" type="slidenum">
+              <a:rPr/>
+              <a:t/>
+            </a:fld>
+            <a:endParaRPr/>
+          </a:p>
+        </p:txBody>
+      </p:sp>
+    </p:spTree>
+  </p:cSld>
+  <p:clrMapOvr>
+    <a:masterClrMapping/>
+  </p:clrMapOvr>
+</p:notes>
+</file>
+
+<file path=ppt/notesSlides/notesSlide12.xml><?xml version="1.0" encoding="utf-8"?>
+<p:notes xmlns:a="http://schemas.openxmlformats.org/drawingml/2006/main" xmlns:r="http://schemas.openxmlformats.org/officeDocument/2006/relationships" xmlns:p="http://schemas.openxmlformats.org/presentationml/2006/main" xmlns:m="http://schemas.openxmlformats.org/officeDocument/2006/math" xmlns:w="http://schemas.openxmlformats.org/wordprocessingml/2006/main">
+  <p:cSld name="">
+    <p:spTree>
+      <p:nvGrpSpPr>
+        <p:cNvPr id="1" name=""/>
+        <p:cNvGrpSpPr/>
+        <p:nvPr/>
+      </p:nvGrpSpPr>
+      <p:grpSpPr bwMode="auto">
+        <a:xfrm>
+          <a:off x="0" y="0"/>
+          <a:ext cx="0" cy="0"/>
+          <a:chOff x="0" y="0"/>
+          <a:chExt cx="0" cy="0"/>
+        </a:xfrm>
+      </p:grpSpPr>
+      <p:sp>
+        <p:nvSpPr>
+          <p:cNvPr id="2019680785" name="Slide Image Placeholder 1"/>
+          <p:cNvSpPr>
+            <a:spLocks noChangeAspect="1" noGrp="1" noRot="1"/>
+          </p:cNvSpPr>
+          <p:nvPr>
+            <p:ph type="sldImg"/>
+          </p:nvPr>
+        </p:nvSpPr>
+        <p:spPr bwMode="auto"/>
+      </p:sp>
+      <p:sp>
+        <p:nvSpPr>
+          <p:cNvPr id="1049421357" name="Notes Placeholder 2"/>
+          <p:cNvSpPr>
+            <a:spLocks noGrp="1"/>
+          </p:cNvSpPr>
+          <p:nvPr>
+            <p:ph type="body" idx="1"/>
+          </p:nvPr>
+        </p:nvSpPr>
+        <p:spPr bwMode="auto"/>
+        <p:txBody>
+          <a:bodyPr/>
+          <a:lstStyle/>
+          <a:p>
+            <a:pPr>
+              <a:defRPr/>
+            </a:pPr>
+            <a:endParaRPr/>
+          </a:p>
+        </p:txBody>
+      </p:sp>
+      <p:sp>
+        <p:nvSpPr>
+          <p:cNvPr id="2005739880" name="Slide Number Placeholder 3"/>
+          <p:cNvSpPr>
+            <a:spLocks noGrp="1"/>
+          </p:cNvSpPr>
+          <p:nvPr>
+            <p:ph type="sldNum" sz="quarter" idx="10"/>
+          </p:nvPr>
+        </p:nvSpPr>
+        <p:spPr bwMode="auto"/>
+        <p:txBody>
+          <a:bodyPr/>
+          <a:lstStyle/>
+          <a:p>
+            <a:pPr>
+              <a:defRPr/>
+            </a:pPr>
+            <a:fld id="{68C90AFE-9309-CD99-FE43-A9034960F479}" type="slidenum">
+              <a:rPr/>
+              <a:t/>
+            </a:fld>
+            <a:endParaRPr/>
+          </a:p>
+        </p:txBody>
+      </p:sp>
+    </p:spTree>
+  </p:cSld>
+  <p:clrMapOvr>
+    <a:masterClrMapping/>
+  </p:clrMapOvr>
+</p:notes>
+</file>
+
+<file path=ppt/notesSlides/notesSlide13.xml><?xml version="1.0" encoding="utf-8"?>
+<p:notes xmlns:a="http://schemas.openxmlformats.org/drawingml/2006/main" xmlns:r="http://schemas.openxmlformats.org/officeDocument/2006/relationships" xmlns:p="http://schemas.openxmlformats.org/presentationml/2006/main" xmlns:m="http://schemas.openxmlformats.org/officeDocument/2006/math" xmlns:w="http://schemas.openxmlformats.org/wordprocessingml/2006/main">
+  <p:cSld name="">
+    <p:spTree>
+      <p:nvGrpSpPr>
+        <p:cNvPr id="1" name=""/>
+        <p:cNvGrpSpPr/>
+        <p:nvPr/>
+      </p:nvGrpSpPr>
+      <p:grpSpPr bwMode="auto">
+        <a:xfrm>
+          <a:off x="0" y="0"/>
+          <a:ext cx="0" cy="0"/>
+          <a:chOff x="0" y="0"/>
+          <a:chExt cx="0" cy="0"/>
+        </a:xfrm>
+      </p:grpSpPr>
+      <p:sp>
+        <p:nvSpPr>
+          <p:cNvPr id="945579458" name="Slide Image Placeholder 1"/>
+          <p:cNvSpPr>
+            <a:spLocks noChangeAspect="1" noGrp="1" noRot="1"/>
+          </p:cNvSpPr>
+          <p:nvPr>
+            <p:ph type="sldImg"/>
+          </p:nvPr>
+        </p:nvSpPr>
+        <p:spPr bwMode="auto"/>
+      </p:sp>
+      <p:sp>
+        <p:nvSpPr>
+          <p:cNvPr id="1103959483" name="Notes Placeholder 2"/>
+          <p:cNvSpPr>
+            <a:spLocks noGrp="1"/>
+          </p:cNvSpPr>
+          <p:nvPr>
+            <p:ph type="body" idx="1"/>
+          </p:nvPr>
+        </p:nvSpPr>
+        <p:spPr bwMode="auto"/>
+        <p:txBody>
+          <a:bodyPr/>
+          <a:lstStyle/>
+          <a:p>
+            <a:pPr>
+              <a:defRPr/>
+            </a:pPr>
+            <a:endParaRPr/>
+          </a:p>
+        </p:txBody>
+      </p:sp>
+      <p:sp>
+        <p:nvSpPr>
+          <p:cNvPr id="934290154" name="Slide Number Placeholder 3"/>
           <p:cNvSpPr>
             <a:spLocks noGrp="1"/>
           </p:cNvSpPr>
@@ -768,7 +940,7 @@
       </p:grpSpPr>
       <p:sp>
         <p:nvSpPr>
-          <p:cNvPr id="994399516" name="Slide Image Placeholder 1"/>
+          <p:cNvPr id="1188798290" name="Slide Image Placeholder 1"/>
           <p:cNvSpPr>
             <a:spLocks noChangeAspect="1" noGrp="1" noRot="1"/>
           </p:cNvSpPr>
@@ -785,7 +957,7 @@
       </p:sp>
       <p:sp>
         <p:nvSpPr>
-          <p:cNvPr id="1163725763" name="Notes Placeholder 2"/>
+          <p:cNvPr id="1848260958" name="Notes Placeholder 2"/>
           <p:cNvSpPr>
             <a:spLocks noGrp="1"/>
           </p:cNvSpPr>
@@ -810,7 +982,7 @@
       </p:sp>
       <p:sp>
         <p:nvSpPr>
-          <p:cNvPr id="819328272" name="Slide Number Placeholder 3"/>
+          <p:cNvPr id="699929535" name="Slide Number Placeholder 3"/>
           <p:cNvSpPr>
             <a:spLocks noGrp="1"/>
           </p:cNvSpPr>
@@ -861,7 +1033,7 @@
       </p:grpSpPr>
       <p:sp>
         <p:nvSpPr>
-          <p:cNvPr id="2" name="Slide Image Placeholder 1"/>
+          <p:cNvPr id="1858539548" name="Slide Image Placeholder 1"/>
           <p:cNvSpPr>
             <a:spLocks noChangeAspect="1" noGrp="1" noRot="1"/>
           </p:cNvSpPr>
@@ -873,7 +1045,7 @@
       </p:sp>
       <p:sp>
         <p:nvSpPr>
-          <p:cNvPr id="3" name="Notes Placeholder 2"/>
+          <p:cNvPr id="373693838" name="Notes Placeholder 2"/>
           <p:cNvSpPr>
             <a:spLocks noGrp="1"/>
           </p:cNvSpPr>
@@ -895,7 +1067,7 @@
       </p:sp>
       <p:sp>
         <p:nvSpPr>
-          <p:cNvPr id="4" name="Slide Number Placeholder 3"/>
+          <p:cNvPr id="460164442" name="Slide Number Placeholder 3"/>
           <p:cNvSpPr>
             <a:spLocks noGrp="1"/>
           </p:cNvSpPr>
@@ -946,7 +1118,7 @@
       </p:grpSpPr>
       <p:sp>
         <p:nvSpPr>
-          <p:cNvPr id="2" name="Slide Image Placeholder 1"/>
+          <p:cNvPr id="1536229854" name="Slide Image Placeholder 1"/>
           <p:cNvSpPr>
             <a:spLocks noChangeAspect="1" noGrp="1" noRot="1"/>
           </p:cNvSpPr>
@@ -958,7 +1130,7 @@
       </p:sp>
       <p:sp>
         <p:nvSpPr>
-          <p:cNvPr id="3" name="Notes Placeholder 2"/>
+          <p:cNvPr id="852087444" name="Notes Placeholder 2"/>
           <p:cNvSpPr>
             <a:spLocks noGrp="1"/>
           </p:cNvSpPr>
@@ -980,7 +1152,7 @@
       </p:sp>
       <p:sp>
         <p:nvSpPr>
-          <p:cNvPr id="4" name="Slide Number Placeholder 3"/>
+          <p:cNvPr id="1294357644" name="Slide Number Placeholder 3"/>
           <p:cNvSpPr>
             <a:spLocks noGrp="1"/>
           </p:cNvSpPr>
@@ -1031,7 +1203,7 @@
       </p:grpSpPr>
       <p:sp>
         <p:nvSpPr>
-          <p:cNvPr id="628052835" name="Slide Image Placeholder 1"/>
+          <p:cNvPr id="609631714" name="Slide Image Placeholder 1"/>
           <p:cNvSpPr>
             <a:spLocks noChangeAspect="1" noGrp="1" noRot="1"/>
           </p:cNvSpPr>
@@ -1043,7 +1215,7 @@
       </p:sp>
       <p:sp>
         <p:nvSpPr>
-          <p:cNvPr id="961779018" name="Notes Placeholder 2"/>
+          <p:cNvPr id="95539013" name="Notes Placeholder 2"/>
           <p:cNvSpPr>
             <a:spLocks noGrp="1"/>
           </p:cNvSpPr>
@@ -1065,7 +1237,7 @@
       </p:sp>
       <p:sp>
         <p:nvSpPr>
-          <p:cNvPr id="448240388" name="Slide Number Placeholder 3"/>
+          <p:cNvPr id="424387276" name="Slide Number Placeholder 3"/>
           <p:cNvSpPr>
             <a:spLocks noGrp="1"/>
           </p:cNvSpPr>
@@ -1081,7 +1253,7 @@
             <a:pPr>
               <a:defRPr/>
             </a:pPr>
-            <a:fld id="{F41696AD-62FC-2B2D-C8B7-C63C23E8C3DF}" type="slidenum">
+            <a:fld id="{B3D2C00F-217A-7E04-AD14-4238F32F73FD}" type="slidenum">
               <a:rPr/>
               <a:t/>
             </a:fld>
@@ -1116,7 +1288,7 @@
       </p:grpSpPr>
       <p:sp>
         <p:nvSpPr>
-          <p:cNvPr id="1755585561" name="Slide Image Placeholder 1"/>
+          <p:cNvPr id="1096752118" name="Slide Image Placeholder 1"/>
           <p:cNvSpPr>
             <a:spLocks noChangeAspect="1" noGrp="1" noRot="1"/>
           </p:cNvSpPr>
@@ -1128,7 +1300,7 @@
       </p:sp>
       <p:sp>
         <p:nvSpPr>
-          <p:cNvPr id="13903637" name="Notes Placeholder 2"/>
+          <p:cNvPr id="142029962" name="Notes Placeholder 2"/>
           <p:cNvSpPr>
             <a:spLocks noGrp="1"/>
           </p:cNvSpPr>
@@ -1150,7 +1322,7 @@
       </p:sp>
       <p:sp>
         <p:nvSpPr>
-          <p:cNvPr id="739229857" name="Slide Number Placeholder 3"/>
+          <p:cNvPr id="2112801340" name="Slide Number Placeholder 3"/>
           <p:cNvSpPr>
             <a:spLocks noGrp="1"/>
           </p:cNvSpPr>
@@ -1166,7 +1338,7 @@
             <a:pPr>
               <a:defRPr/>
             </a:pPr>
-            <a:fld id="{F012129F-F201-C079-6714-AAEB66FC293A}" type="slidenum">
+            <a:fld id="{EEB9C36F-A9D7-01C6-200F-43439020C885}" type="slidenum">
               <a:rPr/>
               <a:t/>
             </a:fld>
@@ -1201,7 +1373,7 @@
       </p:grpSpPr>
       <p:sp>
         <p:nvSpPr>
-          <p:cNvPr id="1279013058" name="Slide Image Placeholder 1"/>
+          <p:cNvPr id="1959888280" name="Slide Image Placeholder 1"/>
           <p:cNvSpPr>
             <a:spLocks noChangeAspect="1" noGrp="1" noRot="1"/>
           </p:cNvSpPr>
@@ -1213,7 +1385,7 @@
       </p:sp>
       <p:sp>
         <p:nvSpPr>
-          <p:cNvPr id="310034367" name="Notes Placeholder 2"/>
+          <p:cNvPr id="1105223390" name="Notes Placeholder 2"/>
           <p:cNvSpPr>
             <a:spLocks noGrp="1"/>
           </p:cNvSpPr>
@@ -1235,7 +1407,7 @@
       </p:sp>
       <p:sp>
         <p:nvSpPr>
-          <p:cNvPr id="1637200457" name="Slide Number Placeholder 3"/>
+          <p:cNvPr id="55354626" name="Slide Number Placeholder 3"/>
           <p:cNvSpPr>
             <a:spLocks noGrp="1"/>
           </p:cNvSpPr>
@@ -1251,7 +1423,7 @@
             <a:pPr>
               <a:defRPr/>
             </a:pPr>
-            <a:fld id="{A6FAF216-783F-CC4F-4152-4CB9247C9A94}" type="slidenum">
+            <a:fld id="{F41696AD-62FC-2B2D-C8B7-C63C23E8C3DF}" type="slidenum">
               <a:rPr/>
               <a:t/>
             </a:fld>
@@ -1286,7 +1458,7 @@
       </p:grpSpPr>
       <p:sp>
         <p:nvSpPr>
-          <p:cNvPr id="1366011061" name="Slide Image Placeholder 1"/>
+          <p:cNvPr id="1200873877" name="Slide Image Placeholder 1"/>
           <p:cNvSpPr>
             <a:spLocks noChangeAspect="1" noGrp="1" noRot="1"/>
           </p:cNvSpPr>
@@ -1298,7 +1470,7 @@
       </p:sp>
       <p:sp>
         <p:nvSpPr>
-          <p:cNvPr id="875581231" name="Notes Placeholder 2"/>
+          <p:cNvPr id="2145048019" name="Notes Placeholder 2"/>
           <p:cNvSpPr>
             <a:spLocks noGrp="1"/>
           </p:cNvSpPr>
@@ -1320,7 +1492,7 @@
       </p:sp>
       <p:sp>
         <p:nvSpPr>
-          <p:cNvPr id="1465195711" name="Slide Number Placeholder 3"/>
+          <p:cNvPr id="899178774" name="Slide Number Placeholder 3"/>
           <p:cNvSpPr>
             <a:spLocks noGrp="1"/>
           </p:cNvSpPr>
@@ -1336,7 +1508,7 @@
             <a:pPr>
               <a:defRPr/>
             </a:pPr>
-            <a:fld id="{1391D14E-50A0-CEC1-FDF1-40276DFA2666}" type="slidenum">
+            <a:fld id="{F012129F-F201-C079-6714-AAEB66FC293A}" type="slidenum">
               <a:rPr/>
               <a:t/>
             </a:fld>
@@ -1371,7 +1543,7 @@
       </p:grpSpPr>
       <p:sp>
         <p:nvSpPr>
-          <p:cNvPr id="2068458860" name="Slide Image Placeholder 1"/>
+          <p:cNvPr id="1974859932" name="Slide Image Placeholder 1"/>
           <p:cNvSpPr>
             <a:spLocks noChangeAspect="1" noGrp="1" noRot="1"/>
           </p:cNvSpPr>
@@ -1383,7 +1555,7 @@
       </p:sp>
       <p:sp>
         <p:nvSpPr>
-          <p:cNvPr id="1211419124" name="Notes Placeholder 2"/>
+          <p:cNvPr id="1430921406" name="Notes Placeholder 2"/>
           <p:cNvSpPr>
             <a:spLocks noGrp="1"/>
           </p:cNvSpPr>
@@ -1405,7 +1577,7 @@
       </p:sp>
       <p:sp>
         <p:nvSpPr>
-          <p:cNvPr id="1868748143" name="Slide Number Placeholder 3"/>
+          <p:cNvPr id="2014447322" name="Slide Number Placeholder 3"/>
           <p:cNvSpPr>
             <a:spLocks noGrp="1"/>
           </p:cNvSpPr>
@@ -1421,7 +1593,7 @@
             <a:pPr>
               <a:defRPr/>
             </a:pPr>
-            <a:fld id="{34FE6285-F706-0E74-EB16-20B02EC7539D}" type="slidenum">
+            <a:fld id="{A6FAF216-783F-CC4F-4152-4CB9247C9A94}" type="slidenum">
               <a:rPr/>
               <a:t/>
             </a:fld>
@@ -1456,7 +1628,7 @@
       </p:grpSpPr>
       <p:sp>
         <p:nvSpPr>
-          <p:cNvPr id="1210615272" name="Title 1"/>
+          <p:cNvPr id="287380539" name="Title 1"/>
           <p:cNvSpPr>
             <a:spLocks noGrp="1"/>
           </p:cNvSpPr>
@@ -1491,7 +1663,7 @@
       </p:sp>
       <p:sp>
         <p:nvSpPr>
-          <p:cNvPr id="1017985096" name="Subtitle 2"/>
+          <p:cNvPr id="982830593" name="Subtitle 2"/>
           <p:cNvSpPr>
             <a:spLocks noGrp="1"/>
           </p:cNvSpPr>
@@ -1559,7 +1731,7 @@
       </p:sp>
       <p:sp>
         <p:nvSpPr>
-          <p:cNvPr id="1920098990" name="Date Placeholder 3"/>
+          <p:cNvPr id="1854783210" name="Date Placeholder 3"/>
           <p:cNvSpPr>
             <a:spLocks noGrp="1"/>
           </p:cNvSpPr>
@@ -1585,7 +1757,7 @@
       </p:sp>
       <p:sp>
         <p:nvSpPr>
-          <p:cNvPr id="1303559121" name="Footer Placeholder 4"/>
+          <p:cNvPr id="2108836434" name="Footer Placeholder 4"/>
           <p:cNvSpPr>
             <a:spLocks noGrp="1"/>
           </p:cNvSpPr>
@@ -1607,7 +1779,7 @@
       </p:sp>
       <p:sp>
         <p:nvSpPr>
-          <p:cNvPr id="2049833997" name="Slide Number Placeholder 5"/>
+          <p:cNvPr id="1477368762" name="Slide Number Placeholder 5"/>
           <p:cNvSpPr>
             <a:spLocks noGrp="1"/>
           </p:cNvSpPr>
@@ -1658,7 +1830,7 @@
       </p:grpSpPr>
       <p:sp>
         <p:nvSpPr>
-          <p:cNvPr id="1728410567" name="Title 1"/>
+          <p:cNvPr id="1439099734" name="Title 1"/>
           <p:cNvSpPr>
             <a:spLocks noGrp="1"/>
           </p:cNvSpPr>
@@ -1684,7 +1856,7 @@
       </p:sp>
       <p:sp>
         <p:nvSpPr>
-          <p:cNvPr id="513512886" name="Vertical Text Placeholder 2"/>
+          <p:cNvPr id="343819568" name="Vertical Text Placeholder 2"/>
           <p:cNvSpPr>
             <a:spLocks noGrp="1"/>
           </p:cNvSpPr>
@@ -1750,7 +1922,7 @@
       </p:sp>
       <p:sp>
         <p:nvSpPr>
-          <p:cNvPr id="1077449396" name="Date Placeholder 3"/>
+          <p:cNvPr id="338816989" name="Date Placeholder 3"/>
           <p:cNvSpPr>
             <a:spLocks noGrp="1"/>
           </p:cNvSpPr>
@@ -1776,7 +1948,7 @@
       </p:sp>
       <p:sp>
         <p:nvSpPr>
-          <p:cNvPr id="1743579525" name="Footer Placeholder 4"/>
+          <p:cNvPr id="1721763791" name="Footer Placeholder 4"/>
           <p:cNvSpPr>
             <a:spLocks noGrp="1"/>
           </p:cNvSpPr>
@@ -1798,7 +1970,7 @@
       </p:sp>
       <p:sp>
         <p:nvSpPr>
-          <p:cNvPr id="844591927" name="Slide Number Placeholder 5"/>
+          <p:cNvPr id="1890489460" name="Slide Number Placeholder 5"/>
           <p:cNvSpPr>
             <a:spLocks noGrp="1"/>
           </p:cNvSpPr>
@@ -1849,7 +2021,7 @@
       </p:grpSpPr>
       <p:sp>
         <p:nvSpPr>
-          <p:cNvPr id="1876550244" name="Vertical Title 1"/>
+          <p:cNvPr id="573618891" name="Vertical Title 1"/>
           <p:cNvSpPr>
             <a:spLocks noGrp="1"/>
           </p:cNvSpPr>
@@ -1880,7 +2052,7 @@
       </p:sp>
       <p:sp>
         <p:nvSpPr>
-          <p:cNvPr id="1261391859" name="Vertical Text Placeholder 2"/>
+          <p:cNvPr id="445284887" name="Vertical Text Placeholder 2"/>
           <p:cNvSpPr>
             <a:spLocks noGrp="1"/>
           </p:cNvSpPr>
@@ -1951,7 +2123,7 @@
       </p:sp>
       <p:sp>
         <p:nvSpPr>
-          <p:cNvPr id="239682987" name="Date Placeholder 3"/>
+          <p:cNvPr id="2100463481" name="Date Placeholder 3"/>
           <p:cNvSpPr>
             <a:spLocks noGrp="1"/>
           </p:cNvSpPr>
@@ -1977,7 +2149,7 @@
       </p:sp>
       <p:sp>
         <p:nvSpPr>
-          <p:cNvPr id="1911880107" name="Footer Placeholder 4"/>
+          <p:cNvPr id="506352482" name="Footer Placeholder 4"/>
           <p:cNvSpPr>
             <a:spLocks noGrp="1"/>
           </p:cNvSpPr>
@@ -1999,7 +2171,7 @@
       </p:sp>
       <p:sp>
         <p:nvSpPr>
-          <p:cNvPr id="1889957354" name="Slide Number Placeholder 5"/>
+          <p:cNvPr id="1222489699" name="Slide Number Placeholder 5"/>
           <p:cNvSpPr>
             <a:spLocks noGrp="1"/>
           </p:cNvSpPr>
@@ -2050,7 +2222,7 @@
       </p:grpSpPr>
       <p:sp>
         <p:nvSpPr>
-          <p:cNvPr id="1900646916" name="Title 1"/>
+          <p:cNvPr id="167278182" name="Title 1"/>
           <p:cNvSpPr>
             <a:spLocks noGrp="1"/>
           </p:cNvSpPr>
@@ -2076,7 +2248,7 @@
       </p:sp>
       <p:sp>
         <p:nvSpPr>
-          <p:cNvPr id="1436561971" name="Content Placeholder 2"/>
+          <p:cNvPr id="1660098454" name="Content Placeholder 2"/>
           <p:cNvSpPr>
             <a:spLocks noGrp="1"/>
           </p:cNvSpPr>
@@ -2142,7 +2314,7 @@
       </p:sp>
       <p:sp>
         <p:nvSpPr>
-          <p:cNvPr id="1169428856" name="Date Placeholder 3"/>
+          <p:cNvPr id="1453907704" name="Date Placeholder 3"/>
           <p:cNvSpPr>
             <a:spLocks noGrp="1"/>
           </p:cNvSpPr>
@@ -2168,7 +2340,7 @@
       </p:sp>
       <p:sp>
         <p:nvSpPr>
-          <p:cNvPr id="1187187343" name="Footer Placeholder 4"/>
+          <p:cNvPr id="1211484184" name="Footer Placeholder 4"/>
           <p:cNvSpPr>
             <a:spLocks noGrp="1"/>
           </p:cNvSpPr>
@@ -2190,7 +2362,7 @@
       </p:sp>
       <p:sp>
         <p:nvSpPr>
-          <p:cNvPr id="2054830766" name="Slide Number Placeholder 5"/>
+          <p:cNvPr id="1907460153" name="Slide Number Placeholder 5"/>
           <p:cNvSpPr>
             <a:spLocks noGrp="1"/>
           </p:cNvSpPr>
@@ -2241,7 +2413,7 @@
       </p:grpSpPr>
       <p:sp>
         <p:nvSpPr>
-          <p:cNvPr id="1870317991" name="Title 1"/>
+          <p:cNvPr id="1253124397" name="Title 1"/>
           <p:cNvSpPr>
             <a:spLocks noGrp="1"/>
           </p:cNvSpPr>
@@ -2276,7 +2448,7 @@
       </p:sp>
       <p:sp>
         <p:nvSpPr>
-          <p:cNvPr id="2011372438" name="Text Placeholder 2"/>
+          <p:cNvPr id="549926388" name="Text Placeholder 2"/>
           <p:cNvSpPr>
             <a:spLocks noGrp="1"/>
           </p:cNvSpPr>
@@ -2398,7 +2570,7 @@
       </p:sp>
       <p:sp>
         <p:nvSpPr>
-          <p:cNvPr id="214844428" name="Date Placeholder 3"/>
+          <p:cNvPr id="1110529680" name="Date Placeholder 3"/>
           <p:cNvSpPr>
             <a:spLocks noGrp="1"/>
           </p:cNvSpPr>
@@ -2424,7 +2596,7 @@
       </p:sp>
       <p:sp>
         <p:nvSpPr>
-          <p:cNvPr id="744890792" name="Footer Placeholder 4"/>
+          <p:cNvPr id="1129935619" name="Footer Placeholder 4"/>
           <p:cNvSpPr>
             <a:spLocks noGrp="1"/>
           </p:cNvSpPr>
@@ -2446,7 +2618,7 @@
       </p:sp>
       <p:sp>
         <p:nvSpPr>
-          <p:cNvPr id="1318187829" name="Slide Number Placeholder 5"/>
+          <p:cNvPr id="689246315" name="Slide Number Placeholder 5"/>
           <p:cNvSpPr>
             <a:spLocks noGrp="1"/>
           </p:cNvSpPr>
@@ -2497,7 +2669,7 @@
       </p:grpSpPr>
       <p:sp>
         <p:nvSpPr>
-          <p:cNvPr id="365881943" name="Title 1"/>
+          <p:cNvPr id="1241083220" name="Title 1"/>
           <p:cNvSpPr>
             <a:spLocks noGrp="1"/>
           </p:cNvSpPr>
@@ -2523,7 +2695,7 @@
       </p:sp>
       <p:sp>
         <p:nvSpPr>
-          <p:cNvPr id="1273856389" name="Content Placeholder 2"/>
+          <p:cNvPr id="1462341041" name="Content Placeholder 2"/>
           <p:cNvSpPr>
             <a:spLocks noGrp="1"/>
           </p:cNvSpPr>
@@ -2594,7 +2766,7 @@
       </p:sp>
       <p:sp>
         <p:nvSpPr>
-          <p:cNvPr id="974513989" name="Content Placeholder 3"/>
+          <p:cNvPr id="1667268150" name="Content Placeholder 3"/>
           <p:cNvSpPr>
             <a:spLocks noGrp="1"/>
           </p:cNvSpPr>
@@ -2665,7 +2837,7 @@
       </p:sp>
       <p:sp>
         <p:nvSpPr>
-          <p:cNvPr id="918229492" name="Date Placeholder 4"/>
+          <p:cNvPr id="486215922" name="Date Placeholder 4"/>
           <p:cNvSpPr>
             <a:spLocks noGrp="1"/>
           </p:cNvSpPr>
@@ -2691,7 +2863,7 @@
       </p:sp>
       <p:sp>
         <p:nvSpPr>
-          <p:cNvPr id="134576494" name="Footer Placeholder 5"/>
+          <p:cNvPr id="1838233033" name="Footer Placeholder 5"/>
           <p:cNvSpPr>
             <a:spLocks noGrp="1"/>
           </p:cNvSpPr>
@@ -2713,7 +2885,7 @@
       </p:sp>
       <p:sp>
         <p:nvSpPr>
-          <p:cNvPr id="835382552" name="Slide Number Placeholder 6"/>
+          <p:cNvPr id="588532846" name="Slide Number Placeholder 6"/>
           <p:cNvSpPr>
             <a:spLocks noGrp="1"/>
           </p:cNvSpPr>
@@ -2764,7 +2936,7 @@
       </p:grpSpPr>
       <p:sp>
         <p:nvSpPr>
-          <p:cNvPr id="1230017978" name="Title 1"/>
+          <p:cNvPr id="1514938305" name="Title 1"/>
           <p:cNvSpPr>
             <a:spLocks noGrp="1"/>
           </p:cNvSpPr>
@@ -2795,7 +2967,7 @@
       </p:sp>
       <p:sp>
         <p:nvSpPr>
-          <p:cNvPr id="429248091" name="Text Placeholder 2"/>
+          <p:cNvPr id="1169993578" name="Text Placeholder 2"/>
           <p:cNvSpPr>
             <a:spLocks noGrp="1"/>
           </p:cNvSpPr>
@@ -2863,7 +3035,7 @@
       </p:sp>
       <p:sp>
         <p:nvSpPr>
-          <p:cNvPr id="1701932943" name="Content Placeholder 3"/>
+          <p:cNvPr id="2145795666" name="Content Placeholder 3"/>
           <p:cNvSpPr>
             <a:spLocks noGrp="1"/>
           </p:cNvSpPr>
@@ -2934,7 +3106,7 @@
       </p:sp>
       <p:sp>
         <p:nvSpPr>
-          <p:cNvPr id="291183834" name="Text Placeholder 4"/>
+          <p:cNvPr id="1316886585" name="Text Placeholder 4"/>
           <p:cNvSpPr>
             <a:spLocks noGrp="1"/>
           </p:cNvSpPr>
@@ -3002,7 +3174,7 @@
       </p:sp>
       <p:sp>
         <p:nvSpPr>
-          <p:cNvPr id="1796581850" name="Content Placeholder 5"/>
+          <p:cNvPr id="1551181483" name="Content Placeholder 5"/>
           <p:cNvSpPr>
             <a:spLocks noGrp="1"/>
           </p:cNvSpPr>
@@ -3073,7 +3245,7 @@
       </p:sp>
       <p:sp>
         <p:nvSpPr>
-          <p:cNvPr id="1686881036" name="Date Placeholder 6"/>
+          <p:cNvPr id="1996839858" name="Date Placeholder 6"/>
           <p:cNvSpPr>
             <a:spLocks noGrp="1"/>
           </p:cNvSpPr>
@@ -3099,7 +3271,7 @@
       </p:sp>
       <p:sp>
         <p:nvSpPr>
-          <p:cNvPr id="1865928315" name="Footer Placeholder 7"/>
+          <p:cNvPr id="1134525303" name="Footer Placeholder 7"/>
           <p:cNvSpPr>
             <a:spLocks noGrp="1"/>
           </p:cNvSpPr>
@@ -3121,7 +3293,7 @@
       </p:sp>
       <p:sp>
         <p:nvSpPr>
-          <p:cNvPr id="429263720" name="Slide Number Placeholder 8"/>
+          <p:cNvPr id="1503953385" name="Slide Number Placeholder 8"/>
           <p:cNvSpPr>
             <a:spLocks noGrp="1"/>
           </p:cNvSpPr>
@@ -3172,7 +3344,7 @@
       </p:grpSpPr>
       <p:sp>
         <p:nvSpPr>
-          <p:cNvPr id="1217915533" name="Title 1"/>
+          <p:cNvPr id="1320745412" name="Title 1"/>
           <p:cNvSpPr>
             <a:spLocks noGrp="1"/>
           </p:cNvSpPr>
@@ -3198,7 +3370,7 @@
       </p:sp>
       <p:sp>
         <p:nvSpPr>
-          <p:cNvPr id="1926804208" name="Date Placeholder 2"/>
+          <p:cNvPr id="922111950" name="Date Placeholder 2"/>
           <p:cNvSpPr>
             <a:spLocks noGrp="1"/>
           </p:cNvSpPr>
@@ -3224,7 +3396,7 @@
       </p:sp>
       <p:sp>
         <p:nvSpPr>
-          <p:cNvPr id="966857504" name="Footer Placeholder 3"/>
+          <p:cNvPr id="698992962" name="Footer Placeholder 3"/>
           <p:cNvSpPr>
             <a:spLocks noGrp="1"/>
           </p:cNvSpPr>
@@ -3246,7 +3418,7 @@
       </p:sp>
       <p:sp>
         <p:nvSpPr>
-          <p:cNvPr id="707233548" name="Slide Number Placeholder 4"/>
+          <p:cNvPr id="1436570492" name="Slide Number Placeholder 4"/>
           <p:cNvSpPr>
             <a:spLocks noGrp="1"/>
           </p:cNvSpPr>
@@ -3297,7 +3469,7 @@
       </p:grpSpPr>
       <p:sp>
         <p:nvSpPr>
-          <p:cNvPr id="1746952629" name="Date Placeholder 1"/>
+          <p:cNvPr id="1440181907" name="Date Placeholder 1"/>
           <p:cNvSpPr>
             <a:spLocks noGrp="1"/>
           </p:cNvSpPr>
@@ -3323,7 +3495,7 @@
       </p:sp>
       <p:sp>
         <p:nvSpPr>
-          <p:cNvPr id="349135314" name="Footer Placeholder 2"/>
+          <p:cNvPr id="169937105" name="Footer Placeholder 2"/>
           <p:cNvSpPr>
             <a:spLocks noGrp="1"/>
           </p:cNvSpPr>
@@ -3345,7 +3517,7 @@
       </p:sp>
       <p:sp>
         <p:nvSpPr>
-          <p:cNvPr id="2131957255" name="Slide Number Placeholder 3"/>
+          <p:cNvPr id="1341063222" name="Slide Number Placeholder 3"/>
           <p:cNvSpPr>
             <a:spLocks noGrp="1"/>
           </p:cNvSpPr>
@@ -3396,7 +3568,7 @@
       </p:grpSpPr>
       <p:sp>
         <p:nvSpPr>
-          <p:cNvPr id="916308538" name="Title 1"/>
+          <p:cNvPr id="1915145194" name="Title 1"/>
           <p:cNvSpPr>
             <a:spLocks noGrp="1"/>
           </p:cNvSpPr>
@@ -3431,7 +3603,7 @@
       </p:sp>
       <p:sp>
         <p:nvSpPr>
-          <p:cNvPr id="453960158" name="Content Placeholder 2"/>
+          <p:cNvPr id="1337587810" name="Content Placeholder 2"/>
           <p:cNvSpPr>
             <a:spLocks noGrp="1"/>
           </p:cNvSpPr>
@@ -3530,7 +3702,7 @@
       </p:sp>
       <p:sp>
         <p:nvSpPr>
-          <p:cNvPr id="892254393" name="Text Placeholder 3"/>
+          <p:cNvPr id="276566723" name="Text Placeholder 3"/>
           <p:cNvSpPr>
             <a:spLocks noGrp="1"/>
           </p:cNvSpPr>
@@ -3598,7 +3770,7 @@
       </p:sp>
       <p:sp>
         <p:nvSpPr>
-          <p:cNvPr id="2042261030" name="Date Placeholder 4"/>
+          <p:cNvPr id="1595335757" name="Date Placeholder 4"/>
           <p:cNvSpPr>
             <a:spLocks noGrp="1"/>
           </p:cNvSpPr>
@@ -3624,7 +3796,7 @@
       </p:sp>
       <p:sp>
         <p:nvSpPr>
-          <p:cNvPr id="1822123966" name="Footer Placeholder 5"/>
+          <p:cNvPr id="1470605468" name="Footer Placeholder 5"/>
           <p:cNvSpPr>
             <a:spLocks noGrp="1"/>
           </p:cNvSpPr>
@@ -3646,7 +3818,7 @@
       </p:sp>
       <p:sp>
         <p:nvSpPr>
-          <p:cNvPr id="1994146546" name="Slide Number Placeholder 6"/>
+          <p:cNvPr id="243603092" name="Slide Number Placeholder 6"/>
           <p:cNvSpPr>
             <a:spLocks noGrp="1"/>
           </p:cNvSpPr>
@@ -3697,7 +3869,7 @@
       </p:grpSpPr>
       <p:sp>
         <p:nvSpPr>
-          <p:cNvPr id="720625301" name="Title 1"/>
+          <p:cNvPr id="1075843276" name="Title 1"/>
           <p:cNvSpPr>
             <a:spLocks noGrp="1"/>
           </p:cNvSpPr>
@@ -3732,7 +3904,7 @@
       </p:sp>
       <p:sp>
         <p:nvSpPr>
-          <p:cNvPr id="1551756405" name="Picture Placeholder 2"/>
+          <p:cNvPr id="1914541046" name="Picture Placeholder 2"/>
           <p:cNvSpPr>
             <a:spLocks noChangeAspect="1" noGrp="1"/>
           </p:cNvSpPr>
@@ -3800,7 +3972,7 @@
       </p:sp>
       <p:sp>
         <p:nvSpPr>
-          <p:cNvPr id="1990473924" name="Text Placeholder 3"/>
+          <p:cNvPr id="293688508" name="Text Placeholder 3"/>
           <p:cNvSpPr>
             <a:spLocks noGrp="1"/>
           </p:cNvSpPr>
@@ -3868,7 +4040,7 @@
       </p:sp>
       <p:sp>
         <p:nvSpPr>
-          <p:cNvPr id="199422817" name="Date Placeholder 4"/>
+          <p:cNvPr id="2017142096" name="Date Placeholder 4"/>
           <p:cNvSpPr>
             <a:spLocks noGrp="1"/>
           </p:cNvSpPr>
@@ -3894,7 +4066,7 @@
       </p:sp>
       <p:sp>
         <p:nvSpPr>
-          <p:cNvPr id="1862622962" name="Footer Placeholder 5"/>
+          <p:cNvPr id="2081793509" name="Footer Placeholder 5"/>
           <p:cNvSpPr>
             <a:spLocks noGrp="1"/>
           </p:cNvSpPr>
@@ -3916,7 +4088,7 @@
       </p:sp>
       <p:sp>
         <p:nvSpPr>
-          <p:cNvPr id="1311920692" name="Slide Number Placeholder 6"/>
+          <p:cNvPr id="1229113029" name="Slide Number Placeholder 6"/>
           <p:cNvSpPr>
             <a:spLocks noGrp="1"/>
           </p:cNvSpPr>
@@ -3972,7 +4144,7 @@
       </p:grpSpPr>
       <p:sp>
         <p:nvSpPr>
-          <p:cNvPr id="1754238078" name="Title Placeholder 1"/>
+          <p:cNvPr id="2018918207" name="Title Placeholder 1"/>
           <p:cNvSpPr>
             <a:spLocks noGrp="1"/>
           </p:cNvSpPr>
@@ -4008,7 +4180,7 @@
       </p:sp>
       <p:sp>
         <p:nvSpPr>
-          <p:cNvPr id="369660560" name="Text Placeholder 2"/>
+          <p:cNvPr id="2038928964" name="Text Placeholder 2"/>
           <p:cNvSpPr>
             <a:spLocks noGrp="1"/>
           </p:cNvSpPr>
@@ -4084,7 +4256,7 @@
       </p:sp>
       <p:sp>
         <p:nvSpPr>
-          <p:cNvPr id="1523409801" name="Date Placeholder 3"/>
+          <p:cNvPr id="1236666711" name="Date Placeholder 3"/>
           <p:cNvSpPr>
             <a:spLocks noGrp="1"/>
           </p:cNvSpPr>
@@ -4128,7 +4300,7 @@
       </p:sp>
       <p:sp>
         <p:nvSpPr>
-          <p:cNvPr id="618140911" name="Footer Placeholder 4"/>
+          <p:cNvPr id="1643644728" name="Footer Placeholder 4"/>
           <p:cNvSpPr>
             <a:spLocks noGrp="1"/>
           </p:cNvSpPr>
@@ -4168,7 +4340,7 @@
       </p:sp>
       <p:sp>
         <p:nvSpPr>
-          <p:cNvPr id="115551093" name="Slide Number Placeholder 5"/>
+          <p:cNvPr id="276661168" name="Slide Number Placeholder 5"/>
           <p:cNvSpPr>
             <a:spLocks noGrp="1"/>
           </p:cNvSpPr>
@@ -4535,7 +4707,7 @@
       </p:grpSpPr>
       <p:sp>
         <p:nvSpPr>
-          <p:cNvPr id="867753054" name=""/>
+          <p:cNvPr id="74453711" name=""/>
           <p:cNvSpPr/>
           <p:nvPr/>
         </p:nvSpPr>
@@ -4575,7 +4747,7 @@
       </p:sp>
       <p:sp>
         <p:nvSpPr>
-          <p:cNvPr id="557863212" name=""/>
+          <p:cNvPr id="1773341972" name=""/>
           <p:cNvSpPr/>
           <p:nvPr/>
         </p:nvSpPr>
@@ -4615,7 +4787,7 @@
       </p:sp>
       <p:sp>
         <p:nvSpPr>
-          <p:cNvPr id="225227815" name=""/>
+          <p:cNvPr id="396324654" name=""/>
           <p:cNvSpPr/>
           <p:nvPr/>
         </p:nvSpPr>
@@ -4655,7 +4827,7 @@
       </p:sp>
       <p:sp>
         <p:nvSpPr>
-          <p:cNvPr id="2013314924" name=""/>
+          <p:cNvPr id="1939174825" name=""/>
           <p:cNvSpPr/>
           <p:nvPr/>
         </p:nvSpPr>
@@ -4695,7 +4867,7 @@
       </p:sp>
       <p:sp>
         <p:nvSpPr>
-          <p:cNvPr id="1692050449" name=""/>
+          <p:cNvPr id="1950680573" name=""/>
           <p:cNvSpPr/>
           <p:nvPr/>
         </p:nvSpPr>
@@ -4735,7 +4907,7 @@
       </p:sp>
       <p:sp>
         <p:nvSpPr>
-          <p:cNvPr id="1033312014" name=""/>
+          <p:cNvPr id="661077110" name=""/>
           <p:cNvSpPr/>
           <p:nvPr/>
         </p:nvSpPr>
@@ -4775,7 +4947,7 @@
       </p:sp>
       <p:sp>
         <p:nvSpPr>
-          <p:cNvPr id="715930001" name=""/>
+          <p:cNvPr id="531917256" name=""/>
           <p:cNvSpPr/>
           <p:nvPr/>
         </p:nvSpPr>
@@ -4815,7 +4987,7 @@
       </p:sp>
       <p:sp>
         <p:nvSpPr>
-          <p:cNvPr id="963974708" name=""/>
+          <p:cNvPr id="992020338" name=""/>
           <p:cNvSpPr/>
           <p:nvPr/>
         </p:nvSpPr>
@@ -4855,7 +5027,7 @@
       </p:sp>
       <p:sp>
         <p:nvSpPr>
-          <p:cNvPr id="1625905154" name=""/>
+          <p:cNvPr id="752669946" name=""/>
           <p:cNvSpPr/>
           <p:nvPr/>
         </p:nvSpPr>
@@ -4895,7 +5067,7 @@
       </p:sp>
       <p:sp>
         <p:nvSpPr>
-          <p:cNvPr id="1877312480" name=""/>
+          <p:cNvPr id="1031433751" name=""/>
           <p:cNvSpPr/>
           <p:nvPr/>
         </p:nvSpPr>
@@ -4935,7 +5107,7 @@
       </p:sp>
       <p:sp>
         <p:nvSpPr>
-          <p:cNvPr id="944182263" name=""/>
+          <p:cNvPr id="359790592" name=""/>
           <p:cNvSpPr/>
           <p:nvPr/>
         </p:nvSpPr>
@@ -4975,7 +5147,7 @@
       </p:sp>
       <p:sp>
         <p:nvSpPr>
-          <p:cNvPr id="515315909" name=""/>
+          <p:cNvPr id="444953548" name=""/>
           <p:cNvSpPr txBox="1"/>
           <p:nvPr/>
         </p:nvSpPr>
@@ -5054,7 +5226,7 @@
       </p:grpSpPr>
       <p:sp>
         <p:nvSpPr>
-          <p:cNvPr id="444269620" name="Title 1"/>
+          <p:cNvPr id="1737792052" name="Title 1"/>
           <p:cNvSpPr>
             <a:spLocks noGrp="1"/>
           </p:cNvSpPr>
@@ -5073,9 +5245,10 @@
             <a:r>
               <a:rPr lang="es-ES">
                 <a:latin typeface="Libertinus Serif"/>
+                <a:ea typeface="Libertinus Serif"/>
                 <a:cs typeface="Libertinus Serif"/>
               </a:rPr>
-              <a:t>Resultados</a:t>
+              <a:t>Respuesta mecánica</a:t>
             </a:r>
             <a:endParaRPr>
               <a:latin typeface="Libertinus Serif"/>
@@ -5086,7 +5259,7 @@
       </p:sp>
       <p:sp>
         <p:nvSpPr>
-          <p:cNvPr id="1420422987" name=""/>
+          <p:cNvPr id="814494226" name=""/>
           <p:cNvSpPr txBox="1"/>
           <p:nvPr/>
         </p:nvSpPr>
@@ -5165,7 +5338,118 @@
       </p:grpSpPr>
       <p:sp>
         <p:nvSpPr>
-          <p:cNvPr id="248509058" name="Title 1"/>
+          <p:cNvPr id="2121783969" name="Title 1"/>
+          <p:cNvSpPr>
+            <a:spLocks noGrp="1"/>
+          </p:cNvSpPr>
+          <p:nvPr>
+            <p:ph type="title"/>
+          </p:nvPr>
+        </p:nvSpPr>
+        <p:spPr bwMode="auto"/>
+        <p:txBody>
+          <a:bodyPr/>
+          <a:lstStyle/>
+          <a:p>
+            <a:pPr>
+              <a:defRPr/>
+            </a:pPr>
+            <a:r>
+              <a:rPr lang="es-ES">
+                <a:latin typeface="Libertinus Serif"/>
+                <a:cs typeface="Libertinus Serif"/>
+              </a:rPr>
+              <a:t>Dinámica Molecular</a:t>
+            </a:r>
+            <a:endParaRPr>
+              <a:latin typeface="Libertinus Serif"/>
+              <a:cs typeface="Libertinus Serif"/>
+            </a:endParaRPr>
+          </a:p>
+        </p:txBody>
+      </p:sp>
+      <p:sp>
+        <p:nvSpPr>
+          <p:cNvPr id="160182233" name=""/>
+          <p:cNvSpPr txBox="1"/>
+          <p:nvPr/>
+        </p:nvSpPr>
+        <p:spPr bwMode="auto">
+          <a:xfrm rot="0" flipH="0" flipV="0">
+            <a:off x="11552352" y="6316350"/>
+            <a:ext cx="313521" cy="427078"/>
+          </a:xfrm>
+          <a:prstGeom prst="rect">
+            <a:avLst/>
+          </a:prstGeom>
+          <a:noFill/>
+        </p:spPr>
+        <p:txBody>
+          <a:bodyPr vertOverflow="overflow" horzOverflow="overflow" vert="horz" wrap="none" lIns="91440" tIns="45720" rIns="91440" bIns="45720" numCol="1" spcCol="0" rtlCol="0" fromWordArt="0" anchor="t" anchorCtr="0" forceAA="0" upright="0" compatLnSpc="0">
+            <a:spAutoFit/>
+          </a:bodyPr>
+          <a:p>
+            <a:pPr>
+              <a:defRPr/>
+            </a:pPr>
+            <a:r>
+              <a:rPr lang="es-ES" sz="2200">
+                <a:latin typeface="Libertinus Serif"/>
+                <a:ea typeface="Libertinus Serif"/>
+                <a:cs typeface="Libertinus Serif"/>
+              </a:rPr>
+              <a:t>2</a:t>
+            </a:r>
+            <a:endParaRPr sz="2200">
+              <a:latin typeface="Libertinus Serif"/>
+              <a:cs typeface="Libertinus Serif"/>
+            </a:endParaRPr>
+          </a:p>
+        </p:txBody>
+      </p:sp>
+    </p:spTree>
+  </p:cSld>
+  <p:clrMapOvr>
+    <a:masterClrMapping/>
+  </p:clrMapOvr>
+  <mc:AlternateContent xmlns:mc="http://schemas.openxmlformats.org/markup-compatibility/2006">
+    <mc:Choice xmlns:p159="http://schemas.microsoft.com/office/powerpoint/2015/09/main" xmlns:p14="http://schemas.microsoft.com/office/powerpoint/2010/main" Requires="p159">
+      <p:transition p14:dur="2000" advClick="1"/>
+    </mc:Choice>
+    <mc:Fallback>
+      <p:transition advClick="1"/>
+    </mc:Fallback>
+  </mc:AlternateContent>
+</p:sld>
+</file>
+
+<file path=ppt/slides/slide12.xml><?xml version="1.0" encoding="utf-8"?>
+<p:sld xmlns:a="http://schemas.openxmlformats.org/drawingml/2006/main" xmlns:r="http://schemas.openxmlformats.org/officeDocument/2006/relationships" xmlns:p="http://schemas.openxmlformats.org/presentationml/2006/main" xmlns:m="http://schemas.openxmlformats.org/officeDocument/2006/math" xmlns:w="http://schemas.openxmlformats.org/wordprocessingml/2006/main" xmlns:mc="http://schemas.openxmlformats.org/markup-compatibility/2006" showMasterPhAnim="0" showMasterSp="1" show="1">
+  <p:cSld name="">
+    <p:bg>
+      <p:bgPr shadeToTitle="0">
+        <a:solidFill>
+          <a:srgbClr val="E5E9F0"/>
+        </a:solidFill>
+      </p:bgPr>
+    </p:bg>
+    <p:spTree>
+      <p:nvGrpSpPr>
+        <p:cNvPr id="1" name=""/>
+        <p:cNvGrpSpPr/>
+        <p:nvPr/>
+      </p:nvGrpSpPr>
+      <p:grpSpPr bwMode="auto">
+        <a:xfrm>
+          <a:off x="0" y="0"/>
+          <a:ext cx="0" cy="0"/>
+          <a:chOff x="0" y="0"/>
+          <a:chExt cx="0" cy="0"/>
+        </a:xfrm>
+      </p:grpSpPr>
+      <p:sp>
+        <p:nvSpPr>
+          <p:cNvPr id="1074677663" name="Title 1"/>
           <p:cNvSpPr>
             <a:spLocks noGrp="1"/>
           </p:cNvSpPr>
@@ -5197,7 +5481,118 @@
       </p:sp>
       <p:sp>
         <p:nvSpPr>
-          <p:cNvPr id="1707343966" name=""/>
+          <p:cNvPr id="1487764068" name=""/>
+          <p:cNvSpPr txBox="1"/>
+          <p:nvPr/>
+        </p:nvSpPr>
+        <p:spPr bwMode="auto">
+          <a:xfrm rot="0" flipH="0" flipV="0">
+            <a:off x="11552352" y="6316350"/>
+            <a:ext cx="313521" cy="427078"/>
+          </a:xfrm>
+          <a:prstGeom prst="rect">
+            <a:avLst/>
+          </a:prstGeom>
+          <a:noFill/>
+        </p:spPr>
+        <p:txBody>
+          <a:bodyPr vertOverflow="overflow" horzOverflow="overflow" vert="horz" wrap="none" lIns="91440" tIns="45720" rIns="91440" bIns="45720" numCol="1" spcCol="0" rtlCol="0" fromWordArt="0" anchor="t" anchorCtr="0" forceAA="0" upright="0" compatLnSpc="0">
+            <a:spAutoFit/>
+          </a:bodyPr>
+          <a:p>
+            <a:pPr>
+              <a:defRPr/>
+            </a:pPr>
+            <a:r>
+              <a:rPr lang="es-ES" sz="2200">
+                <a:latin typeface="Libertinus Serif"/>
+                <a:ea typeface="Libertinus Serif"/>
+                <a:cs typeface="Libertinus Serif"/>
+              </a:rPr>
+              <a:t>2</a:t>
+            </a:r>
+            <a:endParaRPr sz="2200">
+              <a:latin typeface="Libertinus Serif"/>
+              <a:cs typeface="Libertinus Serif"/>
+            </a:endParaRPr>
+          </a:p>
+        </p:txBody>
+      </p:sp>
+    </p:spTree>
+  </p:cSld>
+  <p:clrMapOvr>
+    <a:masterClrMapping/>
+  </p:clrMapOvr>
+  <mc:AlternateContent xmlns:mc="http://schemas.openxmlformats.org/markup-compatibility/2006">
+    <mc:Choice xmlns:p159="http://schemas.microsoft.com/office/powerpoint/2015/09/main" xmlns:p14="http://schemas.microsoft.com/office/powerpoint/2010/main" Requires="p159">
+      <p:transition p14:dur="2000" advClick="1"/>
+    </mc:Choice>
+    <mc:Fallback>
+      <p:transition advClick="1"/>
+    </mc:Fallback>
+  </mc:AlternateContent>
+</p:sld>
+</file>
+
+<file path=ppt/slides/slide13.xml><?xml version="1.0" encoding="utf-8"?>
+<p:sld xmlns:a="http://schemas.openxmlformats.org/drawingml/2006/main" xmlns:r="http://schemas.openxmlformats.org/officeDocument/2006/relationships" xmlns:p="http://schemas.openxmlformats.org/presentationml/2006/main" xmlns:m="http://schemas.openxmlformats.org/officeDocument/2006/math" xmlns:w="http://schemas.openxmlformats.org/wordprocessingml/2006/main" xmlns:mc="http://schemas.openxmlformats.org/markup-compatibility/2006" showMasterPhAnim="0" showMasterSp="1" show="1">
+  <p:cSld name="">
+    <p:bg>
+      <p:bgPr shadeToTitle="0">
+        <a:solidFill>
+          <a:srgbClr val="E5E9F0"/>
+        </a:solidFill>
+      </p:bgPr>
+    </p:bg>
+    <p:spTree>
+      <p:nvGrpSpPr>
+        <p:cNvPr id="1" name=""/>
+        <p:cNvGrpSpPr/>
+        <p:nvPr/>
+      </p:nvGrpSpPr>
+      <p:grpSpPr bwMode="auto">
+        <a:xfrm>
+          <a:off x="0" y="0"/>
+          <a:ext cx="0" cy="0"/>
+          <a:chOff x="0" y="0"/>
+          <a:chExt cx="0" cy="0"/>
+        </a:xfrm>
+      </p:grpSpPr>
+      <p:sp>
+        <p:nvSpPr>
+          <p:cNvPr id="892833701" name="Title 1"/>
+          <p:cNvSpPr>
+            <a:spLocks noGrp="1"/>
+          </p:cNvSpPr>
+          <p:nvPr>
+            <p:ph type="title"/>
+          </p:nvPr>
+        </p:nvSpPr>
+        <p:spPr bwMode="auto"/>
+        <p:txBody>
+          <a:bodyPr/>
+          <a:lstStyle/>
+          <a:p>
+            <a:pPr>
+              <a:defRPr/>
+            </a:pPr>
+            <a:r>
+              <a:rPr lang="es-ES">
+                <a:latin typeface="Libertinus Serif"/>
+                <a:cs typeface="Libertinus Serif"/>
+              </a:rPr>
+              <a:t>Resultados</a:t>
+            </a:r>
+            <a:endParaRPr>
+              <a:latin typeface="Libertinus Serif"/>
+              <a:cs typeface="Libertinus Serif"/>
+            </a:endParaRPr>
+          </a:p>
+        </p:txBody>
+      </p:sp>
+      <p:sp>
+        <p:nvSpPr>
+          <p:cNvPr id="86431707" name=""/>
           <p:cNvSpPr txBox="1"/>
           <p:nvPr/>
         </p:nvSpPr>
@@ -5276,7 +5671,7 @@
       </p:grpSpPr>
       <p:sp>
         <p:nvSpPr>
-          <p:cNvPr id="1185459074" name="Title 1"/>
+          <p:cNvPr id="1210148620" name="Title 1"/>
           <p:cNvSpPr>
             <a:spLocks noGrp="1"/>
           </p:cNvSpPr>
@@ -5300,7 +5695,15 @@
                 <a:ea typeface="Libertinus Serif"/>
                 <a:cs typeface="Libertinus Serif"/>
               </a:rPr>
-              <a:t>Exploración de respuestas mecánicas en Hidrogeles usando simulación numérica</a:t>
+              <a:t>Exploración </a:t>
+            </a:r>
+            <a:r>
+              <a:rPr lang="es-ES">
+                <a:latin typeface="Libertinus Serif"/>
+                <a:ea typeface="Libertinus Serif"/>
+                <a:cs typeface="Libertinus Serif"/>
+              </a:rPr>
+              <a:t>de respuestas mecánicas en Hidrogeles usando simulación numérica</a:t>
             </a:r>
             <a:endParaRPr>
               <a:latin typeface="Libertinus Serif"/>
@@ -5311,7 +5714,7 @@
       </p:sp>
       <p:sp>
         <p:nvSpPr>
-          <p:cNvPr id="802222652" name="Subtitle 2"/>
+          <p:cNvPr id="294417895" name="Subtitle 2"/>
           <p:cNvSpPr>
             <a:spLocks noGrp="1"/>
           </p:cNvSpPr>
@@ -5421,7 +5824,7 @@
       </p:grpSpPr>
       <p:sp>
         <p:nvSpPr>
-          <p:cNvPr id="264917285" name="Title 1"/>
+          <p:cNvPr id="1387039341" name="Title 1"/>
           <p:cNvSpPr>
             <a:spLocks noGrp="1"/>
           </p:cNvSpPr>
@@ -5454,7 +5857,7 @@
       </p:sp>
       <p:sp>
         <p:nvSpPr>
-          <p:cNvPr id="448414509" name=""/>
+          <p:cNvPr id="1087734203" name=""/>
           <p:cNvSpPr txBox="1"/>
           <p:nvPr/>
         </p:nvSpPr>
@@ -5493,7 +5896,7 @@
       </p:sp>
       <p:pic>
         <p:nvPicPr>
-          <p:cNvPr id="241842798" name=""/>
+          <p:cNvPr id="1662334909" name=""/>
           <p:cNvPicPr>
             <a:picLocks noChangeAspect="1"/>
           </p:cNvPicPr>
@@ -5505,7 +5908,7 @@
         </p:blipFill>
         <p:spPr bwMode="auto">
           <a:xfrm flipH="0" flipV="0">
-            <a:off x="4374192" y="1372884"/>
+            <a:off x="4680259" y="1372883"/>
             <a:ext cx="2920674" cy="4130877"/>
           </a:xfrm>
           <a:prstGeom prst="rect">
@@ -5515,7 +5918,7 @@
       </p:pic>
       <p:sp>
         <p:nvSpPr>
-          <p:cNvPr id="1543986820" name=""/>
+          <p:cNvPr id="1201301849" name=""/>
           <p:cNvSpPr txBox="1"/>
           <p:nvPr/>
         </p:nvSpPr>
@@ -5543,13 +5946,13 @@
       </p:sp>
       <p:sp>
         <p:nvSpPr>
-          <p:cNvPr id="1605706735" name=""/>
+          <p:cNvPr id="1942216953" name=""/>
           <p:cNvSpPr/>
           <p:nvPr/>
         </p:nvSpPr>
         <p:spPr bwMode="auto">
           <a:xfrm>
-            <a:off x="4329594" y="5597298"/>
+            <a:off x="4591065" y="5597298"/>
             <a:ext cx="3009868" cy="932592"/>
           </a:xfrm>
           <a:prstGeom prst="rect">
@@ -5882,7 +6285,7 @@
       </p:sp>
       <p:pic>
         <p:nvPicPr>
-          <p:cNvPr id="1917131073" name=""/>
+          <p:cNvPr id="1731002401" name=""/>
           <p:cNvPicPr>
             <a:picLocks noChangeAspect="1"/>
           </p:cNvPicPr>
@@ -5904,7 +6307,7 @@
       </p:pic>
       <p:pic>
         <p:nvPicPr>
-          <p:cNvPr id="217121832" name=""/>
+          <p:cNvPr id="970114724" name=""/>
           <p:cNvPicPr>
             <a:picLocks noChangeAspect="1"/>
           </p:cNvPicPr>
@@ -5926,7 +6329,7 @@
       </p:pic>
       <p:pic>
         <p:nvPicPr>
-          <p:cNvPr id="610103989" name=""/>
+          <p:cNvPr id="1567930385" name=""/>
           <p:cNvPicPr>
             <a:picLocks noChangeAspect="1"/>
           </p:cNvPicPr>
@@ -5938,7 +6341,7 @@
         </p:blipFill>
         <p:spPr bwMode="auto">
           <a:xfrm flipH="0" flipV="0">
-            <a:off x="7775014" y="881205"/>
+            <a:off x="7969964" y="845564"/>
             <a:ext cx="3578785" cy="3578785"/>
           </a:xfrm>
           <a:prstGeom prst="rect">
@@ -5948,7 +6351,7 @@
       </p:pic>
       <p:pic>
         <p:nvPicPr>
-          <p:cNvPr id="784253291" name=""/>
+          <p:cNvPr id="229146341" name=""/>
           <p:cNvPicPr>
             <a:picLocks noChangeAspect="1"/>
           </p:cNvPicPr>
@@ -5960,7 +6363,7 @@
         </p:blipFill>
         <p:spPr bwMode="auto">
           <a:xfrm flipH="0" flipV="0">
-            <a:off x="8367910" y="4424350"/>
+            <a:off x="8570902" y="4297530"/>
             <a:ext cx="2782897" cy="2319081"/>
           </a:xfrm>
           <a:prstGeom prst="rect">
@@ -5987,6 +6390,13 @@
 <file path=ppt/slides/slide4.xml><?xml version="1.0" encoding="utf-8"?>
 <p:sld xmlns:a="http://schemas.openxmlformats.org/drawingml/2006/main" xmlns:r="http://schemas.openxmlformats.org/officeDocument/2006/relationships" xmlns:p="http://schemas.openxmlformats.org/presentationml/2006/main" xmlns:m="http://schemas.openxmlformats.org/officeDocument/2006/math" xmlns:w="http://schemas.openxmlformats.org/wordprocessingml/2006/main" xmlns:mc="http://schemas.openxmlformats.org/markup-compatibility/2006" showMasterPhAnim="0" showMasterSp="1" show="1">
   <p:cSld name="">
+    <p:bg>
+      <p:bgPr shadeToTitle="0">
+        <a:solidFill>
+          <a:srgbClr val="E5E9F0"/>
+        </a:solidFill>
+      </p:bgPr>
+    </p:bg>
     <p:spTree>
       <p:nvGrpSpPr>
         <p:cNvPr id="1" name=""/>
@@ -6003,7 +6413,7 @@
       </p:grpSpPr>
       <p:sp>
         <p:nvSpPr>
-          <p:cNvPr id="1456605931" name="Title 1"/>
+          <p:cNvPr id="1887994637" name="Title 1"/>
           <p:cNvSpPr>
             <a:spLocks noGrp="1"/>
           </p:cNvSpPr>
@@ -6019,13 +6429,21 @@
             <a:pPr>
               <a:defRPr/>
             </a:pPr>
+            <a:r>
+              <a:rPr>
+                <a:latin typeface="Libertinus Serif"/>
+                <a:ea typeface="Libertinus Serif"/>
+                <a:cs typeface="Libertinus Serif"/>
+              </a:rPr>
+              <a:t>Geles</a:t>
+            </a:r>
             <a:endParaRPr/>
           </a:p>
         </p:txBody>
       </p:sp>
       <p:pic>
         <p:nvPicPr>
-          <p:cNvPr id="430868302" name=""/>
+          <p:cNvPr id="759188954" name=""/>
           <p:cNvPicPr>
             <a:picLocks noChangeAspect="1"/>
           </p:cNvPicPr>
@@ -6036,15 +6454,76 @@
           <a:stretch/>
         </p:blipFill>
         <p:spPr bwMode="auto">
-          <a:xfrm>
-            <a:off x="2076916" y="4069696"/>
-            <a:ext cx="1800225" cy="1800225"/>
+          <a:xfrm flipH="0" flipV="0">
+            <a:off x="6629933" y="2335212"/>
+            <a:ext cx="4508391" cy="2998974"/>
           </a:xfrm>
           <a:prstGeom prst="rect">
             <a:avLst/>
           </a:prstGeom>
         </p:spPr>
       </p:pic>
+      <p:pic>
+        <p:nvPicPr>
+          <p:cNvPr id="458325980" name=""/>
+          <p:cNvPicPr>
+            <a:picLocks noChangeAspect="1"/>
+          </p:cNvPicPr>
+          <p:nvPr/>
+        </p:nvPicPr>
+        <p:blipFill rotWithShape="1">
+          <a:blip r:embed="rId4"/>
+          <a:stretch/>
+        </p:blipFill>
+        <p:spPr bwMode="auto">
+          <a:xfrm>
+            <a:off x="1061622" y="2457636"/>
+            <a:ext cx="4324349" cy="2876549"/>
+          </a:xfrm>
+          <a:prstGeom prst="rect">
+            <a:avLst/>
+          </a:prstGeom>
+        </p:spPr>
+      </p:pic>
+      <p:sp>
+        <p:nvSpPr>
+          <p:cNvPr id="2020773905" name=""/>
+          <p:cNvSpPr txBox="1"/>
+          <p:nvPr/>
+        </p:nvSpPr>
+        <p:spPr bwMode="auto">
+          <a:xfrm rot="0" flipH="0" flipV="0">
+            <a:off x="11552351" y="6316350"/>
+            <a:ext cx="313521" cy="427079"/>
+          </a:xfrm>
+          <a:prstGeom prst="rect">
+            <a:avLst/>
+          </a:prstGeom>
+          <a:noFill/>
+        </p:spPr>
+        <p:txBody>
+          <a:bodyPr vertOverflow="overflow" horzOverflow="overflow" vert="horz" wrap="none" lIns="91440" tIns="45720" rIns="91440" bIns="45720" numCol="1" spcCol="0" rtlCol="0" fromWordArt="0" anchor="t" anchorCtr="0" forceAA="0" upright="0" compatLnSpc="0">
+            <a:spAutoFit/>
+          </a:bodyPr>
+          <a:p>
+            <a:pPr>
+              <a:defRPr/>
+            </a:pPr>
+            <a:r>
+              <a:rPr lang="es-ES" sz="2200">
+                <a:latin typeface="Libertinus Serif"/>
+                <a:ea typeface="Libertinus Serif"/>
+                <a:cs typeface="Libertinus Serif"/>
+              </a:rPr>
+              <a:t>1</a:t>
+            </a:r>
+            <a:endParaRPr sz="2200">
+              <a:latin typeface="Libertinus Serif"/>
+              <a:cs typeface="Libertinus Serif"/>
+            </a:endParaRPr>
+          </a:p>
+        </p:txBody>
+      </p:sp>
     </p:spTree>
   </p:cSld>
   <p:clrMapOvr>
@@ -6087,7 +6566,7 @@
       </p:grpSpPr>
       <p:sp>
         <p:nvSpPr>
-          <p:cNvPr id="635937171" name="Title 1"/>
+          <p:cNvPr id="16025911" name="Title 1"/>
           <p:cNvSpPr>
             <a:spLocks noGrp="1"/>
           </p:cNvSpPr>
@@ -6104,23 +6583,20 @@
               <a:defRPr/>
             </a:pPr>
             <a:r>
-              <a:rPr lang="es-ES">
+              <a:rPr>
                 <a:latin typeface="Libertinus Serif"/>
                 <a:ea typeface="Libertinus Serif"/>
                 <a:cs typeface="Libertinus Serif"/>
               </a:rPr>
               <a:t>Geles</a:t>
             </a:r>
-            <a:endParaRPr>
-              <a:latin typeface="Libertinus Serif"/>
-              <a:cs typeface="Libertinus Serif"/>
-            </a:endParaRPr>
-          </a:p>
-        </p:txBody>
-      </p:sp>
-      <p:sp>
-        <p:nvSpPr>
-          <p:cNvPr id="653655282" name=""/>
+            <a:endParaRPr/>
+          </a:p>
+        </p:txBody>
+      </p:sp>
+      <p:sp>
+        <p:nvSpPr>
+          <p:cNvPr id="1365130413" name=""/>
           <p:cNvSpPr txBox="1"/>
           <p:nvPr/>
         </p:nvSpPr>
@@ -6148,7 +6624,7 @@
                 <a:ea typeface="Libertinus Serif"/>
                 <a:cs typeface="Libertinus Serif"/>
               </a:rPr>
-              <a:t>2</a:t>
+              <a:t>1</a:t>
             </a:r>
             <a:endParaRPr sz="2200">
               <a:latin typeface="Libertinus Serif"/>
@@ -6159,7 +6635,7 @@
       </p:sp>
       <p:pic>
         <p:nvPicPr>
-          <p:cNvPr id="1625175791" name=""/>
+          <p:cNvPr id="1918827423" name=""/>
           <p:cNvPicPr>
             <a:picLocks noChangeAspect="1"/>
           </p:cNvPicPr>
@@ -6171,8 +6647,8 @@
         </p:blipFill>
         <p:spPr bwMode="auto">
           <a:xfrm>
-            <a:off x="536014" y="4885577"/>
-            <a:ext cx="1619249" cy="971550"/>
+            <a:off x="1090332" y="2073274"/>
+            <a:ext cx="2876549" cy="2876549"/>
           </a:xfrm>
           <a:prstGeom prst="rect">
             <a:avLst/>
@@ -6181,7 +6657,7 @@
       </p:pic>
       <p:pic>
         <p:nvPicPr>
-          <p:cNvPr id="679091166" name=""/>
+          <p:cNvPr id="2083810435" name=""/>
           <p:cNvPicPr>
             <a:picLocks noChangeAspect="1"/>
           </p:cNvPicPr>
@@ -6193,8 +6669,8 @@
         </p:blipFill>
         <p:spPr bwMode="auto">
           <a:xfrm>
-            <a:off x="4336676" y="4885577"/>
-            <a:ext cx="1619249" cy="971550"/>
+            <a:off x="4657725" y="2073274"/>
+            <a:ext cx="2876549" cy="2876549"/>
           </a:xfrm>
           <a:prstGeom prst="rect">
             <a:avLst/>
@@ -6203,7 +6679,7 @@
       </p:pic>
       <p:pic>
         <p:nvPicPr>
-          <p:cNvPr id="1277387529" name=""/>
+          <p:cNvPr id="1479600599" name=""/>
           <p:cNvPicPr>
             <a:picLocks noChangeAspect="1"/>
           </p:cNvPicPr>
@@ -6215,30 +6691,8 @@
         </p:blipFill>
         <p:spPr bwMode="auto">
           <a:xfrm>
-            <a:off x="2363507" y="4885577"/>
-            <a:ext cx="1619249" cy="971550"/>
-          </a:xfrm>
-          <a:prstGeom prst="rect">
-            <a:avLst/>
-          </a:prstGeom>
-        </p:spPr>
-      </p:pic>
-      <p:pic>
-        <p:nvPicPr>
-          <p:cNvPr id="801578135" name=""/>
-          <p:cNvPicPr>
-            <a:picLocks noChangeAspect="1"/>
-          </p:cNvPicPr>
-          <p:nvPr/>
-        </p:nvPicPr>
-        <p:blipFill rotWithShape="1">
-          <a:blip r:embed="rId6"/>
-          <a:stretch/>
-        </p:blipFill>
-        <p:spPr bwMode="auto">
-          <a:xfrm>
-            <a:off x="2506382" y="3457388"/>
-            <a:ext cx="1333499" cy="895349"/>
+            <a:off x="8255581" y="2073274"/>
+            <a:ext cx="2876549" cy="2876549"/>
           </a:xfrm>
           <a:prstGeom prst="rect">
             <a:avLst/>
@@ -6287,7 +6741,7 @@
       </p:grpSpPr>
       <p:sp>
         <p:nvSpPr>
-          <p:cNvPr id="1691340682" name="Title 1"/>
+          <p:cNvPr id="720223019" name="Title 1"/>
           <p:cNvSpPr>
             <a:spLocks noGrp="1"/>
           </p:cNvSpPr>
@@ -6304,30 +6758,27 @@
               <a:defRPr/>
             </a:pPr>
             <a:r>
-              <a:rPr lang="es-ES">
+              <a:rPr>
                 <a:latin typeface="Libertinus Serif"/>
                 <a:ea typeface="Libertinus Serif"/>
                 <a:cs typeface="Libertinus Serif"/>
               </a:rPr>
-              <a:t>Aplicaciones</a:t>
-            </a:r>
-            <a:endParaRPr>
-              <a:latin typeface="Libertinus Serif"/>
-              <a:cs typeface="Libertinus Serif"/>
-            </a:endParaRPr>
-          </a:p>
-        </p:txBody>
-      </p:sp>
-      <p:sp>
-        <p:nvSpPr>
-          <p:cNvPr id="1502894027" name=""/>
+              <a:t>Text</a:t>
+            </a:r>
+            <a:endParaRPr/>
+          </a:p>
+        </p:txBody>
+      </p:sp>
+      <p:sp>
+        <p:nvSpPr>
+          <p:cNvPr id="543433797" name=""/>
           <p:cNvSpPr txBox="1"/>
           <p:nvPr/>
         </p:nvSpPr>
         <p:spPr bwMode="auto">
           <a:xfrm rot="0" flipH="0" flipV="0">
-            <a:off x="11552352" y="6316350"/>
-            <a:ext cx="313521" cy="427078"/>
+            <a:off x="11552351" y="6316350"/>
+            <a:ext cx="313521" cy="427079"/>
           </a:xfrm>
           <a:prstGeom prst="rect">
             <a:avLst/>
@@ -6348,7 +6799,7 @@
                 <a:ea typeface="Libertinus Serif"/>
                 <a:cs typeface="Libertinus Serif"/>
               </a:rPr>
-              <a:t>2</a:t>
+              <a:t>1</a:t>
             </a:r>
             <a:endParaRPr sz="2200">
               <a:latin typeface="Libertinus Serif"/>
@@ -6357,6 +6808,28 @@
           </a:p>
         </p:txBody>
       </p:sp>
+      <p:pic>
+        <p:nvPicPr>
+          <p:cNvPr id="654051077" name=""/>
+          <p:cNvPicPr>
+            <a:picLocks noChangeAspect="1"/>
+          </p:cNvPicPr>
+          <p:nvPr/>
+        </p:nvPicPr>
+        <p:blipFill rotWithShape="1">
+          <a:blip r:embed="rId3"/>
+          <a:stretch/>
+        </p:blipFill>
+        <p:spPr bwMode="auto">
+          <a:xfrm flipH="0" flipV="0">
+            <a:off x="2913716" y="1082782"/>
+            <a:ext cx="6079960" cy="4857534"/>
+          </a:xfrm>
+          <a:prstGeom prst="rect">
+            <a:avLst/>
+          </a:prstGeom>
+        </p:spPr>
+      </p:pic>
     </p:spTree>
   </p:cSld>
   <p:clrMapOvr>
@@ -6399,7 +6872,7 @@
       </p:grpSpPr>
       <p:sp>
         <p:nvSpPr>
-          <p:cNvPr id="90931426" name="Title 1"/>
+          <p:cNvPr id="1425085756" name="Title 1"/>
           <p:cNvSpPr>
             <a:spLocks noGrp="1"/>
           </p:cNvSpPr>
@@ -6421,7 +6894,7 @@
                 <a:ea typeface="Libertinus Serif"/>
                 <a:cs typeface="Libertinus Serif"/>
               </a:rPr>
-              <a:t>Tesis</a:t>
+              <a:t>Geles</a:t>
             </a:r>
             <a:endParaRPr>
               <a:latin typeface="Libertinus Serif"/>
@@ -6432,14 +6905,14 @@
       </p:sp>
       <p:sp>
         <p:nvSpPr>
-          <p:cNvPr id="708626588" name=""/>
+          <p:cNvPr id="1431325327" name=""/>
           <p:cNvSpPr txBox="1"/>
           <p:nvPr/>
         </p:nvSpPr>
         <p:spPr bwMode="auto">
           <a:xfrm rot="0" flipH="0" flipV="0">
-            <a:off x="11552352" y="6316350"/>
-            <a:ext cx="313521" cy="427078"/>
+            <a:off x="11552351" y="6316350"/>
+            <a:ext cx="313521" cy="427079"/>
           </a:xfrm>
           <a:prstGeom prst="rect">
             <a:avLst/>
@@ -6469,6 +6942,94 @@
           </a:p>
         </p:txBody>
       </p:sp>
+      <p:pic>
+        <p:nvPicPr>
+          <p:cNvPr id="146763828" name=""/>
+          <p:cNvPicPr>
+            <a:picLocks noChangeAspect="1"/>
+          </p:cNvPicPr>
+          <p:nvPr/>
+        </p:nvPicPr>
+        <p:blipFill rotWithShape="1">
+          <a:blip r:embed="rId3"/>
+          <a:stretch/>
+        </p:blipFill>
+        <p:spPr bwMode="auto">
+          <a:xfrm>
+            <a:off x="536014" y="4885577"/>
+            <a:ext cx="1619249" cy="971550"/>
+          </a:xfrm>
+          <a:prstGeom prst="rect">
+            <a:avLst/>
+          </a:prstGeom>
+        </p:spPr>
+      </p:pic>
+      <p:pic>
+        <p:nvPicPr>
+          <p:cNvPr id="1590755337" name=""/>
+          <p:cNvPicPr>
+            <a:picLocks noChangeAspect="1"/>
+          </p:cNvPicPr>
+          <p:nvPr/>
+        </p:nvPicPr>
+        <p:blipFill rotWithShape="1">
+          <a:blip r:embed="rId4"/>
+          <a:stretch/>
+        </p:blipFill>
+        <p:spPr bwMode="auto">
+          <a:xfrm>
+            <a:off x="4336676" y="4885577"/>
+            <a:ext cx="1619249" cy="971550"/>
+          </a:xfrm>
+          <a:prstGeom prst="rect">
+            <a:avLst/>
+          </a:prstGeom>
+        </p:spPr>
+      </p:pic>
+      <p:pic>
+        <p:nvPicPr>
+          <p:cNvPr id="886376485" name=""/>
+          <p:cNvPicPr>
+            <a:picLocks noChangeAspect="1"/>
+          </p:cNvPicPr>
+          <p:nvPr/>
+        </p:nvPicPr>
+        <p:blipFill rotWithShape="1">
+          <a:blip r:embed="rId5"/>
+          <a:stretch/>
+        </p:blipFill>
+        <p:spPr bwMode="auto">
+          <a:xfrm>
+            <a:off x="2363507" y="4885577"/>
+            <a:ext cx="1619249" cy="971550"/>
+          </a:xfrm>
+          <a:prstGeom prst="rect">
+            <a:avLst/>
+          </a:prstGeom>
+        </p:spPr>
+      </p:pic>
+      <p:pic>
+        <p:nvPicPr>
+          <p:cNvPr id="979316431" name=""/>
+          <p:cNvPicPr>
+            <a:picLocks noChangeAspect="1"/>
+          </p:cNvPicPr>
+          <p:nvPr/>
+        </p:nvPicPr>
+        <p:blipFill rotWithShape="1">
+          <a:blip r:embed="rId6"/>
+          <a:stretch/>
+        </p:blipFill>
+        <p:spPr bwMode="auto">
+          <a:xfrm>
+            <a:off x="2506382" y="3457388"/>
+            <a:ext cx="1333499" cy="895349"/>
+          </a:xfrm>
+          <a:prstGeom prst="rect">
+            <a:avLst/>
+          </a:prstGeom>
+        </p:spPr>
+      </p:pic>
     </p:spTree>
   </p:cSld>
   <p:clrMapOvr>
@@ -6511,7 +7072,7 @@
       </p:grpSpPr>
       <p:sp>
         <p:nvSpPr>
-          <p:cNvPr id="1483929934" name="Title 1"/>
+          <p:cNvPr id="539796967" name="Title 1"/>
           <p:cNvSpPr>
             <a:spLocks noGrp="1"/>
           </p:cNvSpPr>
@@ -6533,7 +7094,7 @@
                 <a:ea typeface="Libertinus Serif"/>
                 <a:cs typeface="Libertinus Serif"/>
               </a:rPr>
-              <a:t>Respuesta mecánica</a:t>
+              <a:t>Aplicaciones</a:t>
             </a:r>
             <a:endParaRPr>
               <a:latin typeface="Libertinus Serif"/>
@@ -6544,7 +7105,7 @@
       </p:sp>
       <p:sp>
         <p:nvSpPr>
-          <p:cNvPr id="851613187" name=""/>
+          <p:cNvPr id="1742064266" name=""/>
           <p:cNvSpPr txBox="1"/>
           <p:nvPr/>
         </p:nvSpPr>
@@ -6623,7 +7184,7 @@
       </p:grpSpPr>
       <p:sp>
         <p:nvSpPr>
-          <p:cNvPr id="1253652081" name="Title 1"/>
+          <p:cNvPr id="1188082078" name="Title 1"/>
           <p:cNvSpPr>
             <a:spLocks noGrp="1"/>
           </p:cNvSpPr>
@@ -6642,9 +7203,10 @@
             <a:r>
               <a:rPr lang="es-ES">
                 <a:latin typeface="Libertinus Serif"/>
+                <a:ea typeface="Libertinus Serif"/>
                 <a:cs typeface="Libertinus Serif"/>
               </a:rPr>
-              <a:t>Dinámica Molecular</a:t>
+              <a:t>Tesis</a:t>
             </a:r>
             <a:endParaRPr>
               <a:latin typeface="Libertinus Serif"/>
@@ -6655,7 +7217,7 @@
       </p:sp>
       <p:sp>
         <p:nvSpPr>
-          <p:cNvPr id="1135954607" name=""/>
+          <p:cNvPr id="325766080" name=""/>
           <p:cNvSpPr txBox="1"/>
           <p:nvPr/>
         </p:nvSpPr>

</xml_diff>